<commit_message>
projecten werkend gemaakt en dashboard project up-to-date gemaakt
het dashboard project was verouderd maar is nu net zoals de andere projecten volledig functionerend
</commit_message>
<xml_diff>
--- a/projects/dash/powerpoints/chatbot emiel.pptx
+++ b/projects/dash/powerpoints/chatbot emiel.pptx
@@ -105,6 +105,11 @@
       </a:defRPr>
     </a:lvl9pPr>
   </p:defaultTextStyle>
+  <p:extLst>
+    <p:ext uri="{EFAFB233-063F-42B5-8137-9DF3F51BA10A}">
+      <p15:sldGuideLst xmlns:p15="http://schemas.microsoft.com/office/powerpoint/2012/main"/>
+    </p:ext>
+  </p:extLst>
 </p:presentation>
 </file>
 
@@ -255,7 +260,7 @@
           <a:p>
             <a:fld id="{78199ED4-7D75-4616-B424-014325B4090D}" type="datetimeFigureOut">
               <a:rPr lang="nl-NL" smtClean="0"/>
-              <a:t>13-4-2023</a:t>
+              <a:t>23-5-2023</a:t>
             </a:fld>
             <a:endParaRPr lang="nl-NL"/>
           </a:p>
@@ -453,7 +458,7 @@
           <a:p>
             <a:fld id="{78199ED4-7D75-4616-B424-014325B4090D}" type="datetimeFigureOut">
               <a:rPr lang="nl-NL" smtClean="0"/>
-              <a:t>13-4-2023</a:t>
+              <a:t>23-5-2023</a:t>
             </a:fld>
             <a:endParaRPr lang="nl-NL"/>
           </a:p>
@@ -661,7 +666,7 @@
           <a:p>
             <a:fld id="{78199ED4-7D75-4616-B424-014325B4090D}" type="datetimeFigureOut">
               <a:rPr lang="nl-NL" smtClean="0"/>
-              <a:t>13-4-2023</a:t>
+              <a:t>23-5-2023</a:t>
             </a:fld>
             <a:endParaRPr lang="nl-NL"/>
           </a:p>
@@ -859,7 +864,7 @@
           <a:p>
             <a:fld id="{78199ED4-7D75-4616-B424-014325B4090D}" type="datetimeFigureOut">
               <a:rPr lang="nl-NL" smtClean="0"/>
-              <a:t>13-4-2023</a:t>
+              <a:t>23-5-2023</a:t>
             </a:fld>
             <a:endParaRPr lang="nl-NL"/>
           </a:p>
@@ -1134,7 +1139,7 @@
           <a:p>
             <a:fld id="{78199ED4-7D75-4616-B424-014325B4090D}" type="datetimeFigureOut">
               <a:rPr lang="nl-NL" smtClean="0"/>
-              <a:t>13-4-2023</a:t>
+              <a:t>23-5-2023</a:t>
             </a:fld>
             <a:endParaRPr lang="nl-NL"/>
           </a:p>
@@ -1399,7 +1404,7 @@
           <a:p>
             <a:fld id="{78199ED4-7D75-4616-B424-014325B4090D}" type="datetimeFigureOut">
               <a:rPr lang="nl-NL" smtClean="0"/>
-              <a:t>13-4-2023</a:t>
+              <a:t>23-5-2023</a:t>
             </a:fld>
             <a:endParaRPr lang="nl-NL"/>
           </a:p>
@@ -1811,7 +1816,7 @@
           <a:p>
             <a:fld id="{78199ED4-7D75-4616-B424-014325B4090D}" type="datetimeFigureOut">
               <a:rPr lang="nl-NL" smtClean="0"/>
-              <a:t>13-4-2023</a:t>
+              <a:t>23-5-2023</a:t>
             </a:fld>
             <a:endParaRPr lang="nl-NL"/>
           </a:p>
@@ -1952,7 +1957,7 @@
           <a:p>
             <a:fld id="{78199ED4-7D75-4616-B424-014325B4090D}" type="datetimeFigureOut">
               <a:rPr lang="nl-NL" smtClean="0"/>
-              <a:t>13-4-2023</a:t>
+              <a:t>23-5-2023</a:t>
             </a:fld>
             <a:endParaRPr lang="nl-NL"/>
           </a:p>
@@ -2065,7 +2070,7 @@
           <a:p>
             <a:fld id="{78199ED4-7D75-4616-B424-014325B4090D}" type="datetimeFigureOut">
               <a:rPr lang="nl-NL" smtClean="0"/>
-              <a:t>13-4-2023</a:t>
+              <a:t>23-5-2023</a:t>
             </a:fld>
             <a:endParaRPr lang="nl-NL"/>
           </a:p>
@@ -2376,7 +2381,7 @@
           <a:p>
             <a:fld id="{78199ED4-7D75-4616-B424-014325B4090D}" type="datetimeFigureOut">
               <a:rPr lang="nl-NL" smtClean="0"/>
-              <a:t>13-4-2023</a:t>
+              <a:t>23-5-2023</a:t>
             </a:fld>
             <a:endParaRPr lang="nl-NL"/>
           </a:p>
@@ -2664,7 +2669,7 @@
           <a:p>
             <a:fld id="{78199ED4-7D75-4616-B424-014325B4090D}" type="datetimeFigureOut">
               <a:rPr lang="nl-NL" smtClean="0"/>
-              <a:t>13-4-2023</a:t>
+              <a:t>23-5-2023</a:t>
             </a:fld>
             <a:endParaRPr lang="nl-NL"/>
           </a:p>
@@ -2905,7 +2910,7 @@
           <a:p>
             <a:fld id="{78199ED4-7D75-4616-B424-014325B4090D}" type="datetimeFigureOut">
               <a:rPr lang="nl-NL" smtClean="0"/>
-              <a:t>13-4-2023</a:t>
+              <a:t>23-5-2023</a:t>
             </a:fld>
             <a:endParaRPr lang="nl-NL"/>
           </a:p>
@@ -3440,7 +3445,7 @@
         <p:spPr>
           <a:xfrm>
             <a:off x="2950368" y="5743575"/>
-            <a:ext cx="4786311" cy="535781"/>
+            <a:ext cx="3512215" cy="535781"/>
           </a:xfrm>
           <a:prstGeom prst="rect">
             <a:avLst/>
@@ -3699,6 +3704,67 @@
               </a:rPr>
               <a:t> javascript</a:t>
             </a:r>
+          </a:p>
+        </p:txBody>
+      </p:sp>
+      <p:sp>
+        <p:nvSpPr>
+          <p:cNvPr id="2" name="Rechthoek 1">
+            <a:extLst>
+              <a:ext uri="{FF2B5EF4-FFF2-40B4-BE49-F238E27FC236}">
+                <a16:creationId xmlns:a16="http://schemas.microsoft.com/office/drawing/2014/main" id="{29A7987F-B746-ABF8-855B-946F8F9C792B}"/>
+              </a:ext>
+            </a:extLst>
+          </p:cNvPr>
+          <p:cNvSpPr/>
+          <p:nvPr/>
+        </p:nvSpPr>
+        <p:spPr>
+          <a:xfrm>
+            <a:off x="6709719" y="5743575"/>
+            <a:ext cx="1026959" cy="535781"/>
+          </a:xfrm>
+          <a:prstGeom prst="rect">
+            <a:avLst/>
+          </a:prstGeom>
+          <a:solidFill>
+            <a:schemeClr val="bg1"/>
+          </a:solidFill>
+        </p:spPr>
+        <p:style>
+          <a:lnRef idx="2">
+            <a:schemeClr val="accent1">
+              <a:shade val="50000"/>
+            </a:schemeClr>
+          </a:lnRef>
+          <a:fillRef idx="1">
+            <a:schemeClr val="accent1"/>
+          </a:fillRef>
+          <a:effectRef idx="0">
+            <a:schemeClr val="accent1"/>
+          </a:effectRef>
+          <a:fontRef idx="minor">
+            <a:schemeClr val="lt1"/>
+          </a:fontRef>
+        </p:style>
+        <p:txBody>
+          <a:bodyPr rtlCol="0" anchor="ctr"/>
+          <a:lstStyle/>
+          <a:p>
+            <a:pPr algn="ctr"/>
+            <a:r>
+              <a:rPr lang="nl-NL" dirty="0" err="1">
+                <a:solidFill>
+                  <a:schemeClr val="tx1"/>
+                </a:solidFill>
+              </a:rPr>
+              <a:t>send</a:t>
+            </a:r>
+            <a:endParaRPr lang="nl-NL" dirty="0">
+              <a:solidFill>
+                <a:schemeClr val="tx1"/>
+              </a:solidFill>
+            </a:endParaRPr>
           </a:p>
         </p:txBody>
       </p:sp>

</xml_diff>